<commit_message>
correct x-axis label on regression_validation.png and related files
</commit_message>
<xml_diff>
--- a/docs/final_report.pptx
+++ b/docs/final_report.pptx
@@ -293,7 +293,7 @@
             <a:fld id="{48A87A34-81AB-432B-8DAE-1953F412C126}" type="datetimeFigureOut">
               <a:rPr lang="en-US" smtClean="0"/>
               <a:pPr/>
-              <a:t>6/14/2020</a:t>
+              <a:t>6/15/2020</a:t>
             </a:fld>
             <a:endParaRPr lang="en-US" dirty="0"/>
           </a:p>
@@ -514,7 +514,7 @@
           <a:p>
             <a:fld id="{48A87A34-81AB-432B-8DAE-1953F412C126}" type="datetimeFigureOut">
               <a:rPr lang="en-US" dirty="0"/>
-              <a:t>6/14/2020</a:t>
+              <a:t>6/15/2020</a:t>
             </a:fld>
             <a:endParaRPr lang="en-US" dirty="0"/>
           </a:p>
@@ -724,7 +724,7 @@
           <a:p>
             <a:fld id="{48A87A34-81AB-432B-8DAE-1953F412C126}" type="datetimeFigureOut">
               <a:rPr lang="en-US" dirty="0"/>
-              <a:t>6/14/2020</a:t>
+              <a:t>6/15/2020</a:t>
             </a:fld>
             <a:endParaRPr lang="en-US" dirty="0"/>
           </a:p>
@@ -961,7 +961,7 @@
           <a:p>
             <a:fld id="{48A87A34-81AB-432B-8DAE-1953F412C126}" type="datetimeFigureOut">
               <a:rPr lang="en-US" dirty="0"/>
-              <a:t>6/14/2020</a:t>
+              <a:t>6/15/2020</a:t>
             </a:fld>
             <a:endParaRPr lang="en-US" dirty="0"/>
           </a:p>
@@ -1235,7 +1235,7 @@
           <a:p>
             <a:fld id="{48A87A34-81AB-432B-8DAE-1953F412C126}" type="datetimeFigureOut">
               <a:rPr lang="en-US" dirty="0"/>
-              <a:t>6/14/2020</a:t>
+              <a:t>6/15/2020</a:t>
             </a:fld>
             <a:endParaRPr lang="en-US" dirty="0"/>
           </a:p>
@@ -1498,7 +1498,7 @@
           <a:p>
             <a:fld id="{48A87A34-81AB-432B-8DAE-1953F412C126}" type="datetimeFigureOut">
               <a:rPr lang="en-US" dirty="0"/>
-              <a:t>6/14/2020</a:t>
+              <a:t>6/15/2020</a:t>
             </a:fld>
             <a:endParaRPr lang="en-US" dirty="0"/>
           </a:p>
@@ -1909,7 +1909,7 @@
           <a:p>
             <a:fld id="{48A87A34-81AB-432B-8DAE-1953F412C126}" type="datetimeFigureOut">
               <a:rPr lang="en-US" dirty="0"/>
-              <a:t>6/14/2020</a:t>
+              <a:t>6/15/2020</a:t>
             </a:fld>
             <a:endParaRPr lang="en-US" dirty="0"/>
           </a:p>
@@ -2053,7 +2053,7 @@
           <a:p>
             <a:fld id="{48A87A34-81AB-432B-8DAE-1953F412C126}" type="datetimeFigureOut">
               <a:rPr lang="en-US" dirty="0"/>
-              <a:t>6/14/2020</a:t>
+              <a:t>6/15/2020</a:t>
             </a:fld>
             <a:endParaRPr lang="en-US" dirty="0"/>
           </a:p>
@@ -2174,7 +2174,7 @@
           <a:p>
             <a:fld id="{48A87A34-81AB-432B-8DAE-1953F412C126}" type="datetimeFigureOut">
               <a:rPr lang="en-US" dirty="0"/>
-              <a:t>6/14/2020</a:t>
+              <a:t>6/15/2020</a:t>
             </a:fld>
             <a:endParaRPr lang="en-US" dirty="0"/>
           </a:p>
@@ -2420,7 +2420,7 @@
           <a:p>
             <a:fld id="{48A87A34-81AB-432B-8DAE-1953F412C126}" type="datetimeFigureOut">
               <a:rPr lang="en-US" dirty="0"/>
-              <a:t>6/14/2020</a:t>
+              <a:t>6/15/2020</a:t>
             </a:fld>
             <a:endParaRPr lang="en-US" dirty="0"/>
           </a:p>
@@ -2861,7 +2861,7 @@
             <a:fld id="{48A87A34-81AB-432B-8DAE-1953F412C126}" type="datetimeFigureOut">
               <a:rPr lang="en-US" dirty="0"/>
               <a:pPr/>
-              <a:t>6/14/2020</a:t>
+              <a:t>6/15/2020</a:t>
             </a:fld>
             <a:endParaRPr lang="en-US" dirty="0"/>
           </a:p>
@@ -3184,7 +3184,7 @@
             <a:fld id="{48A87A34-81AB-432B-8DAE-1953F412C126}" type="datetimeFigureOut">
               <a:rPr lang="en-US" dirty="0"/>
               <a:pPr/>
-              <a:t>6/14/2020</a:t>
+              <a:t>6/15/2020</a:t>
             </a:fld>
             <a:endParaRPr lang="en-US" dirty="0"/>
           </a:p>
@@ -7365,35 +7365,6 @@
       </p:sp>
       <p:pic>
         <p:nvPicPr>
-          <p:cNvPr id="4" name="內容版面配置區 3">
-            <a:extLst>
-              <a:ext uri="{FF2B5EF4-FFF2-40B4-BE49-F238E27FC236}">
-                <a16:creationId xmlns:a16="http://schemas.microsoft.com/office/drawing/2014/main" id="{57B3E7EB-3AE8-4544-8F14-C62DD513A63C}"/>
-              </a:ext>
-            </a:extLst>
-          </p:cNvPr>
-          <p:cNvPicPr>
-            <a:picLocks noGrp="1" noChangeAspect="1"/>
-          </p:cNvPicPr>
-          <p:nvPr>
-            <p:ph idx="1"/>
-          </p:nvPr>
-        </p:nvPicPr>
-        <p:blipFill>
-          <a:blip r:embed="rId2"/>
-          <a:stretch>
-            <a:fillRect/>
-          </a:stretch>
-        </p:blipFill>
-        <p:spPr>
-          <a:xfrm>
-            <a:off x="1237731" y="2058183"/>
-            <a:ext cx="3449638" cy="3449638"/>
-          </a:xfrm>
-        </p:spPr>
-      </p:pic>
-      <p:pic>
-        <p:nvPicPr>
           <p:cNvPr id="7" name="圖片 6">
             <a:extLst>
               <a:ext uri="{FF2B5EF4-FFF2-40B4-BE49-F238E27FC236}">
@@ -7407,7 +7378,7 @@
           <p:nvPr/>
         </p:nvPicPr>
         <p:blipFill>
-          <a:blip r:embed="rId3"/>
+          <a:blip r:embed="rId2"/>
           <a:stretch>
             <a:fillRect/>
           </a:stretch>
@@ -7420,6 +7391,35 @@
           <a:prstGeom prst="rect">
             <a:avLst/>
           </a:prstGeom>
+        </p:spPr>
+      </p:pic>
+      <p:pic>
+        <p:nvPicPr>
+          <p:cNvPr id="8" name="內容版面配置區 7">
+            <a:extLst>
+              <a:ext uri="{FF2B5EF4-FFF2-40B4-BE49-F238E27FC236}">
+                <a16:creationId xmlns:a16="http://schemas.microsoft.com/office/drawing/2014/main" id="{4358D1FB-B1CD-49E0-A7ED-1BB7C228058B}"/>
+              </a:ext>
+            </a:extLst>
+          </p:cNvPr>
+          <p:cNvPicPr>
+            <a:picLocks noGrp="1" noChangeAspect="1"/>
+          </p:cNvPicPr>
+          <p:nvPr>
+            <p:ph idx="1"/>
+          </p:nvPr>
+        </p:nvPicPr>
+        <p:blipFill>
+          <a:blip r:embed="rId3"/>
+          <a:stretch>
+            <a:fillRect/>
+          </a:stretch>
+        </p:blipFill>
+        <p:spPr>
+          <a:xfrm>
+            <a:off x="2262222" y="2058184"/>
+            <a:ext cx="3449638" cy="3449638"/>
+          </a:xfrm>
         </p:spPr>
       </p:pic>
     </p:spTree>

</xml_diff>